<commit_message>
Reword slide 24, Fixing Bug 1972
</commit_message>
<xml_diff>
--- a/help/InstructionTabSlides_v25.pptx
+++ b/help/InstructionTabSlides_v25.pptx
@@ -268,7 +268,7 @@
             <a:fld id="{5E98772E-6DB8-CE42-8F3B-49E723230B98}" type="datetimeFigureOut">
               <a:rPr lang="en-US" smtClean="0"/>
               <a:pPr/>
-              <a:t>11/29/2012</a:t>
+              <a:t>2/27/13</a:t>
             </a:fld>
             <a:endParaRPr lang="en-US"/>
           </a:p>
@@ -558,29 +558,19 @@
       </p:grpSpPr>
       <p:sp>
         <p:nvSpPr>
-          <p:cNvPr id="88066" name="Slide Image Placeholder 1"/>
+          <p:cNvPr id="2" name="Slide Image Placeholder 1"/>
           <p:cNvSpPr>
-            <a:spLocks noGrp="1" noRot="1" noChangeAspect="1" noTextEdit="1"/>
+            <a:spLocks noGrp="1" noRot="1" noChangeAspect="1"/>
           </p:cNvSpPr>
           <p:nvPr>
             <p:ph type="sldImg"/>
           </p:nvPr>
         </p:nvSpPr>
-        <p:spPr bwMode="auto">
-          <a:noFill/>
-          <a:ln>
-            <a:solidFill>
-              <a:srgbClr val="000000"/>
-            </a:solidFill>
-            <a:miter lim="800000"/>
-            <a:headEnd/>
-            <a:tailEnd/>
-          </a:ln>
-        </p:spPr>
-      </p:sp>
-      <p:sp>
-        <p:nvSpPr>
-          <p:cNvPr id="88067" name="Notes Placeholder 2"/>
+        <p:spPr/>
+      </p:sp>
+      <p:sp>
+        <p:nvSpPr>
+          <p:cNvPr id="3" name="Notes Placeholder 2"/>
           <p:cNvSpPr>
             <a:spLocks noGrp="1"/>
           </p:cNvSpPr>
@@ -588,53 +578,68 @@
             <p:ph type="body" idx="1"/>
           </p:nvPr>
         </p:nvSpPr>
-        <p:spPr bwMode="auto">
-          <a:noFill/>
-        </p:spPr>
+        <p:spPr/>
         <p:txBody>
           <a:bodyPr/>
           <a:lstStyle/>
           <a:p>
-            <a:pPr eaLnBrk="1" hangingPunct="1">
+            <a:pPr marL="0" marR="0" indent="0" algn="l" defTabSz="457200" rtl="0" eaLnBrk="1" fontAlgn="auto" latinLnBrk="0" hangingPunct="1">
+              <a:lnSpc>
+                <a:spcPct val="100000"/>
+              </a:lnSpc>
               <a:spcBef>
-                <a:spcPct val="0"/>
+                <a:spcPts val="0"/>
               </a:spcBef>
+              <a:spcAft>
+                <a:spcPts val="0"/>
+              </a:spcAft>
+              <a:buClrTx/>
+              <a:buSzTx/>
+              <a:buFontTx/>
+              <a:buNone/>
+              <a:tabLst/>
+              <a:defRPr/>
             </a:pPr>
+            <a:r>
+              <a:rPr lang="en-US" smtClean="0"/>
+              <a:t>Save as 567x425 pixels.</a:t>
+            </a:r>
+          </a:p>
+          <a:p>
             <a:endParaRPr lang="en-US"/>
           </a:p>
         </p:txBody>
       </p:sp>
       <p:sp>
         <p:nvSpPr>
-          <p:cNvPr id="46084" name="Slide Number Placeholder 3"/>
+          <p:cNvPr id="4" name="Slide Number Placeholder 3"/>
           <p:cNvSpPr>
             <a:spLocks noGrp="1"/>
           </p:cNvSpPr>
           <p:nvPr>
-            <p:ph type="sldNum" sz="quarter" idx="5"/>
+            <p:ph type="sldNum" sz="quarter" idx="10"/>
           </p:nvPr>
         </p:nvSpPr>
-        <p:spPr bwMode="auto">
-          <a:ln>
-            <a:miter lim="800000"/>
-            <a:headEnd/>
-            <a:tailEnd/>
-          </a:ln>
-        </p:spPr>
+        <p:spPr/>
         <p:txBody>
           <a:bodyPr/>
           <a:lstStyle/>
           <a:p>
-            <a:fld id="{9D7C1763-E17F-884D-8898-1D57CD294F9B}" type="slidenum">
-              <a:rPr lang="en-US"/>
+            <a:fld id="{258780A5-B5E6-834F-B349-01D3BD1B922F}" type="slidenum">
+              <a:rPr lang="en-US" smtClean="0"/>
               <a:pPr/>
-              <a:t>14</a:t>
+              <a:t>1</a:t>
             </a:fld>
             <a:endParaRPr lang="en-US"/>
           </a:p>
         </p:txBody>
       </p:sp>
     </p:spTree>
+    <p:extLst>
+      <p:ext uri="{BB962C8B-B14F-4D97-AF65-F5344CB8AC3E}">
+        <p14:creationId xmlns:p14="http://schemas.microsoft.com/office/powerpoint/2010/main" val="3428952943"/>
+      </p:ext>
+    </p:extLst>
   </p:cSld>
   <p:clrMapOvr>
     <a:masterClrMapping/>
@@ -731,7 +736,7 @@
             <a:fld id="{9D7C1763-E17F-884D-8898-1D57CD294F9B}" type="slidenum">
               <a:rPr lang="en-US"/>
               <a:pPr/>
-              <a:t>19</a:t>
+              <a:t>14</a:t>
             </a:fld>
             <a:endParaRPr lang="en-US"/>
           </a:p>
@@ -834,7 +839,7 @@
             <a:fld id="{9D7C1763-E17F-884D-8898-1D57CD294F9B}" type="slidenum">
               <a:rPr lang="en-US"/>
               <a:pPr/>
-              <a:t>39</a:t>
+              <a:t>19</a:t>
             </a:fld>
             <a:endParaRPr lang="en-US"/>
           </a:p>
@@ -867,29 +872,19 @@
       </p:grpSpPr>
       <p:sp>
         <p:nvSpPr>
-          <p:cNvPr id="88066" name="Slide Image Placeholder 1"/>
+          <p:cNvPr id="2" name="Slide Image Placeholder 1"/>
           <p:cNvSpPr>
-            <a:spLocks noGrp="1" noRot="1" noChangeAspect="1" noTextEdit="1"/>
+            <a:spLocks noGrp="1" noRot="1" noChangeAspect="1"/>
           </p:cNvSpPr>
           <p:nvPr>
             <p:ph type="sldImg"/>
           </p:nvPr>
         </p:nvSpPr>
-        <p:spPr bwMode="auto">
-          <a:noFill/>
-          <a:ln>
-            <a:solidFill>
-              <a:srgbClr val="000000"/>
-            </a:solidFill>
-            <a:miter lim="800000"/>
-            <a:headEnd/>
-            <a:tailEnd/>
-          </a:ln>
-        </p:spPr>
-      </p:sp>
-      <p:sp>
-        <p:nvSpPr>
-          <p:cNvPr id="88067" name="Notes Placeholder 2"/>
+        <p:spPr/>
+      </p:sp>
+      <p:sp>
+        <p:nvSpPr>
+          <p:cNvPr id="3" name="Notes Placeholder 2"/>
           <p:cNvSpPr>
             <a:spLocks noGrp="1"/>
           </p:cNvSpPr>
@@ -897,53 +892,49 @@
             <p:ph type="body" idx="1"/>
           </p:nvPr>
         </p:nvSpPr>
-        <p:spPr bwMode="auto">
-          <a:noFill/>
-        </p:spPr>
+        <p:spPr/>
         <p:txBody>
           <a:bodyPr/>
           <a:lstStyle/>
           <a:p>
-            <a:pPr eaLnBrk="1" hangingPunct="1">
-              <a:spcBef>
-                <a:spcPct val="0"/>
-              </a:spcBef>
-            </a:pPr>
-            <a:endParaRPr lang="en-US"/>
-          </a:p>
-        </p:txBody>
-      </p:sp>
-      <p:sp>
-        <p:nvSpPr>
-          <p:cNvPr id="46084" name="Slide Number Placeholder 3"/>
+            <a:r>
+              <a:rPr lang="en-US" dirty="0" smtClean="0"/>
+              <a:t>Save as 567x425 pixels.</a:t>
+            </a:r>
+            <a:endParaRPr lang="en-US" dirty="0"/>
+          </a:p>
+        </p:txBody>
+      </p:sp>
+      <p:sp>
+        <p:nvSpPr>
+          <p:cNvPr id="4" name="Slide Number Placeholder 3"/>
           <p:cNvSpPr>
             <a:spLocks noGrp="1"/>
           </p:cNvSpPr>
           <p:nvPr>
-            <p:ph type="sldNum" sz="quarter" idx="5"/>
+            <p:ph type="sldNum" sz="quarter" idx="10"/>
           </p:nvPr>
         </p:nvSpPr>
-        <p:spPr bwMode="auto">
-          <a:ln>
-            <a:miter lim="800000"/>
-            <a:headEnd/>
-            <a:tailEnd/>
-          </a:ln>
-        </p:spPr>
+        <p:spPr/>
         <p:txBody>
           <a:bodyPr/>
           <a:lstStyle/>
           <a:p>
-            <a:fld id="{9D7C1763-E17F-884D-8898-1D57CD294F9B}" type="slidenum">
-              <a:rPr lang="en-US"/>
+            <a:fld id="{258780A5-B5E6-834F-B349-01D3BD1B922F}" type="slidenum">
+              <a:rPr lang="en-US" smtClean="0"/>
               <a:pPr/>
-              <a:t>47</a:t>
+              <a:t>24</a:t>
             </a:fld>
             <a:endParaRPr lang="en-US"/>
           </a:p>
         </p:txBody>
       </p:sp>
     </p:spTree>
+    <p:extLst>
+      <p:ext uri="{BB962C8B-B14F-4D97-AF65-F5344CB8AC3E}">
+        <p14:creationId xmlns:p14="http://schemas.microsoft.com/office/powerpoint/2010/main" val="3950240114"/>
+      </p:ext>
+    </p:extLst>
   </p:cSld>
   <p:clrMapOvr>
     <a:masterClrMapping/>
@@ -1040,7 +1031,7 @@
             <a:fld id="{9D7C1763-E17F-884D-8898-1D57CD294F9B}" type="slidenum">
               <a:rPr lang="en-US"/>
               <a:pPr/>
-              <a:t>49</a:t>
+              <a:t>39</a:t>
             </a:fld>
             <a:endParaRPr lang="en-US"/>
           </a:p>
@@ -1143,6 +1134,212 @@
             <a:fld id="{9D7C1763-E17F-884D-8898-1D57CD294F9B}" type="slidenum">
               <a:rPr lang="en-US"/>
               <a:pPr/>
+              <a:t>47</a:t>
+            </a:fld>
+            <a:endParaRPr lang="en-US"/>
+          </a:p>
+        </p:txBody>
+      </p:sp>
+    </p:spTree>
+  </p:cSld>
+  <p:clrMapOvr>
+    <a:masterClrMapping/>
+  </p:clrMapOvr>
+</p:notes>
+</file>
+
+<file path=ppt/notesSlides/notesSlide7.xml><?xml version="1.0" encoding="utf-8"?>
+<p:notes xmlns:a="http://schemas.openxmlformats.org/drawingml/2006/main" xmlns:r="http://schemas.openxmlformats.org/officeDocument/2006/relationships" xmlns:p="http://schemas.openxmlformats.org/presentationml/2006/main">
+  <p:cSld>
+    <p:spTree>
+      <p:nvGrpSpPr>
+        <p:cNvPr id="1" name=""/>
+        <p:cNvGrpSpPr/>
+        <p:nvPr/>
+      </p:nvGrpSpPr>
+      <p:grpSpPr>
+        <a:xfrm>
+          <a:off x="0" y="0"/>
+          <a:ext cx="0" cy="0"/>
+          <a:chOff x="0" y="0"/>
+          <a:chExt cx="0" cy="0"/>
+        </a:xfrm>
+      </p:grpSpPr>
+      <p:sp>
+        <p:nvSpPr>
+          <p:cNvPr id="88066" name="Slide Image Placeholder 1"/>
+          <p:cNvSpPr>
+            <a:spLocks noGrp="1" noRot="1" noChangeAspect="1" noTextEdit="1"/>
+          </p:cNvSpPr>
+          <p:nvPr>
+            <p:ph type="sldImg"/>
+          </p:nvPr>
+        </p:nvSpPr>
+        <p:spPr bwMode="auto">
+          <a:noFill/>
+          <a:ln>
+            <a:solidFill>
+              <a:srgbClr val="000000"/>
+            </a:solidFill>
+            <a:miter lim="800000"/>
+            <a:headEnd/>
+            <a:tailEnd/>
+          </a:ln>
+        </p:spPr>
+      </p:sp>
+      <p:sp>
+        <p:nvSpPr>
+          <p:cNvPr id="88067" name="Notes Placeholder 2"/>
+          <p:cNvSpPr>
+            <a:spLocks noGrp="1"/>
+          </p:cNvSpPr>
+          <p:nvPr>
+            <p:ph type="body" idx="1"/>
+          </p:nvPr>
+        </p:nvSpPr>
+        <p:spPr bwMode="auto">
+          <a:noFill/>
+        </p:spPr>
+        <p:txBody>
+          <a:bodyPr/>
+          <a:lstStyle/>
+          <a:p>
+            <a:pPr eaLnBrk="1" hangingPunct="1">
+              <a:spcBef>
+                <a:spcPct val="0"/>
+              </a:spcBef>
+            </a:pPr>
+            <a:endParaRPr lang="en-US"/>
+          </a:p>
+        </p:txBody>
+      </p:sp>
+      <p:sp>
+        <p:nvSpPr>
+          <p:cNvPr id="46084" name="Slide Number Placeholder 3"/>
+          <p:cNvSpPr>
+            <a:spLocks noGrp="1"/>
+          </p:cNvSpPr>
+          <p:nvPr>
+            <p:ph type="sldNum" sz="quarter" idx="5"/>
+          </p:nvPr>
+        </p:nvSpPr>
+        <p:spPr bwMode="auto">
+          <a:ln>
+            <a:miter lim="800000"/>
+            <a:headEnd/>
+            <a:tailEnd/>
+          </a:ln>
+        </p:spPr>
+        <p:txBody>
+          <a:bodyPr/>
+          <a:lstStyle/>
+          <a:p>
+            <a:fld id="{9D7C1763-E17F-884D-8898-1D57CD294F9B}" type="slidenum">
+              <a:rPr lang="en-US"/>
+              <a:pPr/>
+              <a:t>49</a:t>
+            </a:fld>
+            <a:endParaRPr lang="en-US"/>
+          </a:p>
+        </p:txBody>
+      </p:sp>
+    </p:spTree>
+  </p:cSld>
+  <p:clrMapOvr>
+    <a:masterClrMapping/>
+  </p:clrMapOvr>
+</p:notes>
+</file>
+
+<file path=ppt/notesSlides/notesSlide8.xml><?xml version="1.0" encoding="utf-8"?>
+<p:notes xmlns:a="http://schemas.openxmlformats.org/drawingml/2006/main" xmlns:r="http://schemas.openxmlformats.org/officeDocument/2006/relationships" xmlns:p="http://schemas.openxmlformats.org/presentationml/2006/main">
+  <p:cSld>
+    <p:spTree>
+      <p:nvGrpSpPr>
+        <p:cNvPr id="1" name=""/>
+        <p:cNvGrpSpPr/>
+        <p:nvPr/>
+      </p:nvGrpSpPr>
+      <p:grpSpPr>
+        <a:xfrm>
+          <a:off x="0" y="0"/>
+          <a:ext cx="0" cy="0"/>
+          <a:chOff x="0" y="0"/>
+          <a:chExt cx="0" cy="0"/>
+        </a:xfrm>
+      </p:grpSpPr>
+      <p:sp>
+        <p:nvSpPr>
+          <p:cNvPr id="88066" name="Slide Image Placeholder 1"/>
+          <p:cNvSpPr>
+            <a:spLocks noGrp="1" noRot="1" noChangeAspect="1" noTextEdit="1"/>
+          </p:cNvSpPr>
+          <p:nvPr>
+            <p:ph type="sldImg"/>
+          </p:nvPr>
+        </p:nvSpPr>
+        <p:spPr bwMode="auto">
+          <a:noFill/>
+          <a:ln>
+            <a:solidFill>
+              <a:srgbClr val="000000"/>
+            </a:solidFill>
+            <a:miter lim="800000"/>
+            <a:headEnd/>
+            <a:tailEnd/>
+          </a:ln>
+        </p:spPr>
+      </p:sp>
+      <p:sp>
+        <p:nvSpPr>
+          <p:cNvPr id="88067" name="Notes Placeholder 2"/>
+          <p:cNvSpPr>
+            <a:spLocks noGrp="1"/>
+          </p:cNvSpPr>
+          <p:nvPr>
+            <p:ph type="body" idx="1"/>
+          </p:nvPr>
+        </p:nvSpPr>
+        <p:spPr bwMode="auto">
+          <a:noFill/>
+        </p:spPr>
+        <p:txBody>
+          <a:bodyPr/>
+          <a:lstStyle/>
+          <a:p>
+            <a:pPr eaLnBrk="1" hangingPunct="1">
+              <a:spcBef>
+                <a:spcPct val="0"/>
+              </a:spcBef>
+            </a:pPr>
+            <a:endParaRPr lang="en-US"/>
+          </a:p>
+        </p:txBody>
+      </p:sp>
+      <p:sp>
+        <p:nvSpPr>
+          <p:cNvPr id="46084" name="Slide Number Placeholder 3"/>
+          <p:cNvSpPr>
+            <a:spLocks noGrp="1"/>
+          </p:cNvSpPr>
+          <p:nvPr>
+            <p:ph type="sldNum" sz="quarter" idx="5"/>
+          </p:nvPr>
+        </p:nvSpPr>
+        <p:spPr bwMode="auto">
+          <a:ln>
+            <a:miter lim="800000"/>
+            <a:headEnd/>
+            <a:tailEnd/>
+          </a:ln>
+        </p:spPr>
+        <p:txBody>
+          <a:bodyPr/>
+          <a:lstStyle/>
+          <a:p>
+            <a:fld id="{9D7C1763-E17F-884D-8898-1D57CD294F9B}" type="slidenum">
+              <a:rPr lang="en-US"/>
+              <a:pPr/>
               <a:t>57</a:t>
             </a:fld>
             <a:endParaRPr lang="en-US"/>
@@ -1339,7 +1536,7 @@
             <a:fld id="{8A92B3B4-C511-48A0-907F-FFFE6FE6A8A3}" type="datetime1">
               <a:rPr lang="en-US" smtClean="0"/>
               <a:pPr/>
-              <a:t>11/29/2012</a:t>
+              <a:t>2/27/13</a:t>
             </a:fld>
             <a:endParaRPr lang="en-US"/>
           </a:p>
@@ -1506,7 +1703,7 @@
             <a:fld id="{338DA375-4F26-4967-BAB5-1DF0038E0813}" type="datetime1">
               <a:rPr lang="en-US" smtClean="0"/>
               <a:pPr/>
-              <a:t>11/29/2012</a:t>
+              <a:t>2/27/13</a:t>
             </a:fld>
             <a:endParaRPr lang="en-US"/>
           </a:p>
@@ -1683,7 +1880,7 @@
             <a:fld id="{774C6A85-57F0-469E-8508-0E7DEBAEC89D}" type="datetime1">
               <a:rPr lang="en-US" smtClean="0"/>
               <a:pPr/>
-              <a:t>11/29/2012</a:t>
+              <a:t>2/27/13</a:t>
             </a:fld>
             <a:endParaRPr lang="en-US"/>
           </a:p>
@@ -1850,7 +2047,7 @@
             <a:fld id="{9F2DF5C3-F000-4A9D-900F-589118060026}" type="datetime1">
               <a:rPr lang="en-US" smtClean="0"/>
               <a:pPr/>
-              <a:t>11/29/2012</a:t>
+              <a:t>2/27/13</a:t>
             </a:fld>
             <a:endParaRPr lang="en-US"/>
           </a:p>
@@ -2093,7 +2290,7 @@
             <a:fld id="{64F76882-EDAA-458A-9762-E1FAD6B6F60C}" type="datetime1">
               <a:rPr lang="en-US" smtClean="0"/>
               <a:pPr/>
-              <a:t>11/29/2012</a:t>
+              <a:t>2/27/13</a:t>
             </a:fld>
             <a:endParaRPr lang="en-US"/>
           </a:p>
@@ -2378,7 +2575,7 @@
             <a:fld id="{0156B5A8-C2C9-43BE-A295-140467E95710}" type="datetime1">
               <a:rPr lang="en-US" smtClean="0"/>
               <a:pPr/>
-              <a:t>11/29/2012</a:t>
+              <a:t>2/27/13</a:t>
             </a:fld>
             <a:endParaRPr lang="en-US"/>
           </a:p>
@@ -2797,7 +2994,7 @@
             <a:fld id="{3F5D9D98-2422-48C3-A6CB-B7615EA119F2}" type="datetime1">
               <a:rPr lang="en-US" smtClean="0"/>
               <a:pPr/>
-              <a:t>11/29/2012</a:t>
+              <a:t>2/27/13</a:t>
             </a:fld>
             <a:endParaRPr lang="en-US"/>
           </a:p>
@@ -2912,7 +3109,7 @@
             <a:fld id="{2FDDFE47-643F-4786-A110-73287995AA96}" type="datetime1">
               <a:rPr lang="en-US" smtClean="0"/>
               <a:pPr/>
-              <a:t>11/29/2012</a:t>
+              <a:t>2/27/13</a:t>
             </a:fld>
             <a:endParaRPr lang="en-US"/>
           </a:p>
@@ -3004,7 +3201,7 @@
             <a:fld id="{096DE362-AB2C-43A2-9461-A50433792CD0}" type="datetime1">
               <a:rPr lang="en-US" smtClean="0"/>
               <a:pPr/>
-              <a:t>11/29/2012</a:t>
+              <a:t>2/27/13</a:t>
             </a:fld>
             <a:endParaRPr lang="en-US"/>
           </a:p>
@@ -3278,7 +3475,7 @@
             <a:fld id="{FC0776D3-FA38-40A2-9101-99921B36CD14}" type="datetime1">
               <a:rPr lang="en-US" smtClean="0"/>
               <a:pPr/>
-              <a:t>11/29/2012</a:t>
+              <a:t>2/27/13</a:t>
             </a:fld>
             <a:endParaRPr lang="en-US"/>
           </a:p>
@@ -3528,7 +3725,7 @@
             <a:fld id="{9662B56A-BF3E-40E8-A8DD-67A598B02CC0}" type="datetime1">
               <a:rPr lang="en-US" smtClean="0"/>
               <a:pPr/>
-              <a:t>11/29/2012</a:t>
+              <a:t>2/27/13</a:t>
             </a:fld>
             <a:endParaRPr lang="en-US"/>
           </a:p>
@@ -3738,7 +3935,7 @@
             <a:fld id="{417C867F-61F0-4D32-A386-E1F613B319EC}" type="datetime1">
               <a:rPr lang="en-US" smtClean="0"/>
               <a:pPr/>
-              <a:t>11/29/2012</a:t>
+              <a:t>2/27/13</a:t>
             </a:fld>
             <a:endParaRPr lang="en-US"/>
           </a:p>
@@ -4200,7 +4397,7 @@
           <p:nvPr/>
         </p:nvPicPr>
         <p:blipFill>
-          <a:blip r:embed="rId2"/>
+          <a:blip r:embed="rId3"/>
           <a:stretch>
             <a:fillRect/>
           </a:stretch>
@@ -4252,7 +4449,7 @@
   <p:timing>
     <p:tnLst>
       <p:par>
-        <p:cTn id="1" dur="indefinite" restart="never" nodeType="tmRoot"/>
+        <p:cTn xmlns:p14="http://schemas.microsoft.com/office/powerpoint/2010/main" id="1" dur="indefinite" restart="never" nodeType="tmRoot"/>
       </p:par>
     </p:tnLst>
   </p:timing>
@@ -4750,7 +4947,7 @@
   <p:timing>
     <p:tnLst>
       <p:par>
-        <p:cTn id="1" dur="indefinite" restart="never" nodeType="tmRoot"/>
+        <p:cTn xmlns:p14="http://schemas.microsoft.com/office/powerpoint/2010/main" id="1" dur="indefinite" restart="never" nodeType="tmRoot"/>
       </p:par>
     </p:tnLst>
   </p:timing>
@@ -5493,7 +5690,7 @@
   <p:timing>
     <p:tnLst>
       <p:par>
-        <p:cTn id="1" dur="indefinite" restart="never" nodeType="tmRoot"/>
+        <p:cTn xmlns:p14="http://schemas.microsoft.com/office/powerpoint/2010/main" id="1" dur="indefinite" restart="never" nodeType="tmRoot"/>
       </p:par>
     </p:tnLst>
   </p:timing>
@@ -6042,7 +6239,7 @@
   <p:timing>
     <p:tnLst>
       <p:par>
-        <p:cTn id="1" dur="indefinite" restart="never" nodeType="tmRoot"/>
+        <p:cTn xmlns:p14="http://schemas.microsoft.com/office/powerpoint/2010/main" id="1" dur="indefinite" restart="never" nodeType="tmRoot"/>
       </p:par>
     </p:tnLst>
   </p:timing>
@@ -6663,7 +6860,7 @@
   <p:timing>
     <p:tnLst>
       <p:par>
-        <p:cTn id="1" dur="indefinite" restart="never" nodeType="tmRoot"/>
+        <p:cTn xmlns:p14="http://schemas.microsoft.com/office/powerpoint/2010/main" id="1" dur="indefinite" restart="never" nodeType="tmRoot"/>
       </p:par>
     </p:tnLst>
   </p:timing>
@@ -7106,7 +7303,7 @@
   <p:timing>
     <p:tnLst>
       <p:par>
-        <p:cTn id="1" dur="indefinite" restart="never" nodeType="tmRoot"/>
+        <p:cTn xmlns:p14="http://schemas.microsoft.com/office/powerpoint/2010/main" id="1" dur="indefinite" restart="never" nodeType="tmRoot"/>
       </p:par>
     </p:tnLst>
   </p:timing>
@@ -7393,7 +7590,7 @@
   <p:timing>
     <p:tnLst>
       <p:par>
-        <p:cTn id="1" dur="indefinite" restart="never" nodeType="tmRoot"/>
+        <p:cTn xmlns:p14="http://schemas.microsoft.com/office/powerpoint/2010/main" id="1" dur="indefinite" restart="never" nodeType="tmRoot"/>
       </p:par>
     </p:tnLst>
   </p:timing>
@@ -8116,7 +8313,7 @@
   <p:timing>
     <p:tnLst>
       <p:par>
-        <p:cTn id="1" dur="indefinite" restart="never" nodeType="tmRoot"/>
+        <p:cTn xmlns:p14="http://schemas.microsoft.com/office/powerpoint/2010/main" id="1" dur="indefinite" restart="never" nodeType="tmRoot"/>
       </p:par>
     </p:tnLst>
   </p:timing>
@@ -9423,7 +9620,7 @@
   <p:timing>
     <p:tnLst>
       <p:par>
-        <p:cTn id="1" dur="indefinite" restart="never" nodeType="tmRoot"/>
+        <p:cTn xmlns:p14="http://schemas.microsoft.com/office/powerpoint/2010/main" id="1" dur="indefinite" restart="never" nodeType="tmRoot"/>
       </p:par>
     </p:tnLst>
   </p:timing>
@@ -9700,7 +9897,7 @@
   <p:timing>
     <p:tnLst>
       <p:par>
-        <p:cTn id="1" dur="indefinite" restart="never" nodeType="tmRoot"/>
+        <p:cTn xmlns:p14="http://schemas.microsoft.com/office/powerpoint/2010/main" id="1" dur="indefinite" restart="never" nodeType="tmRoot"/>
       </p:par>
     </p:tnLst>
   </p:timing>
@@ -10253,14 +10450,14 @@
           </a:ln>
           <a:effectLst/>
           <a:extLst>
-            <a:ext uri="{909E8E84-426E-40DD-AFC4-6F175D3DCCD1}">
+            <a:ext uri="{909E8E84-426E-40dd-AFC4-6F175D3DCCD1}">
               <a14:hiddenFill xmlns:a14="http://schemas.microsoft.com/office/drawing/2010/main">
                 <a:solidFill>
                   <a:schemeClr val="accent1"/>
                 </a:solidFill>
               </a14:hiddenFill>
             </a:ext>
-            <a:ext uri="{91240B29-F687-4F45-9708-019B960494DF}">
+            <a:ext uri="{91240B29-F687-4f45-9708-019B960494DF}">
               <a14:hiddenLine xmlns:a14="http://schemas.microsoft.com/office/drawing/2010/main" w="9525">
                 <a:solidFill>
                   <a:schemeClr val="tx1"/>
@@ -10270,7 +10467,7 @@
                 <a:tailEnd/>
               </a14:hiddenLine>
             </a:ext>
-            <a:ext uri="{AF507438-7753-43E0-B8FC-AC1667EBCBE1}">
+            <a:ext uri="{AF507438-7753-43e0-B8FC-AC1667EBCBE1}">
               <a14:hiddenEffects xmlns:a14="http://schemas.microsoft.com/office/drawing/2010/main">
                 <a:effectLst>
                   <a:outerShdw dist="35921" dir="2700000" algn="ctr" rotWithShape="0">
@@ -11003,14 +11200,14 @@
           </a:ln>
           <a:effectLst/>
           <a:extLst>
-            <a:ext uri="{909E8E84-426E-40DD-AFC4-6F175D3DCCD1}">
+            <a:ext uri="{909E8E84-426E-40dd-AFC4-6F175D3DCCD1}">
               <a14:hiddenFill xmlns:a14="http://schemas.microsoft.com/office/drawing/2010/main">
                 <a:solidFill>
                   <a:schemeClr val="accent1"/>
                 </a:solidFill>
               </a14:hiddenFill>
             </a:ext>
-            <a:ext uri="{91240B29-F687-4F45-9708-019B960494DF}">
+            <a:ext uri="{91240B29-F687-4f45-9708-019B960494DF}">
               <a14:hiddenLine xmlns:a14="http://schemas.microsoft.com/office/drawing/2010/main" w="9525">
                 <a:solidFill>
                   <a:schemeClr val="tx1"/>
@@ -11020,7 +11217,7 @@
                 <a:tailEnd/>
               </a14:hiddenLine>
             </a:ext>
-            <a:ext uri="{AF507438-7753-43E0-B8FC-AC1667EBCBE1}">
+            <a:ext uri="{AF507438-7753-43e0-B8FC-AC1667EBCBE1}">
               <a14:hiddenEffects xmlns:a14="http://schemas.microsoft.com/office/drawing/2010/main">
                 <a:effectLst>
                   <a:outerShdw dist="35921" dir="2700000" algn="ctr" rotWithShape="0">
@@ -11270,7 +11467,7 @@
           <p:nvPr/>
         </p:nvPicPr>
         <p:blipFill>
-          <a:blip r:embed="rId2">
+          <a:blip r:embed="rId3">
             <a:extLst>
               <a:ext uri="{28A0092B-C50C-407E-A947-70E740481C1C}">
                 <a14:useLocalDpi xmlns:a14="http://schemas.microsoft.com/office/drawing/2010/main" val="0"/>
@@ -11296,14 +11493,14 @@
           </a:ln>
           <a:effectLst/>
           <a:extLst>
-            <a:ext uri="{909E8E84-426E-40DD-AFC4-6F175D3DCCD1}">
+            <a:ext uri="{909E8E84-426E-40dd-AFC4-6F175D3DCCD1}">
               <a14:hiddenFill xmlns:a14="http://schemas.microsoft.com/office/drawing/2010/main">
                 <a:solidFill>
                   <a:schemeClr val="accent1"/>
                 </a:solidFill>
               </a14:hiddenFill>
             </a:ext>
-            <a:ext uri="{91240B29-F687-4F45-9708-019B960494DF}">
+            <a:ext uri="{91240B29-F687-4f45-9708-019B960494DF}">
               <a14:hiddenLine xmlns:a14="http://schemas.microsoft.com/office/drawing/2010/main" w="9525">
                 <a:solidFill>
                   <a:schemeClr val="tx1"/>
@@ -11313,7 +11510,7 @@
                 <a:tailEnd/>
               </a14:hiddenLine>
             </a:ext>
-            <a:ext uri="{AF507438-7753-43E0-B8FC-AC1667EBCBE1}">
+            <a:ext uri="{AF507438-7753-43e0-B8FC-AC1667EBCBE1}">
               <a14:hiddenEffects xmlns:a14="http://schemas.microsoft.com/office/drawing/2010/main">
                 <a:effectLst>
                   <a:outerShdw dist="35921" dir="2700000" algn="ctr" rotWithShape="0">
@@ -11369,15 +11566,7 @@
                   <a:schemeClr val="tx1"/>
                 </a:solidFill>
               </a:rPr>
-              <a:t>If you have failed several times, you can </a:t>
-            </a:r>
-            <a:r>
-              <a:rPr lang="en-US" sz="2000" dirty="0" smtClean="0">
-                <a:solidFill>
-                  <a:schemeClr val="tx1"/>
-                </a:solidFill>
-              </a:rPr>
-              <a:t>let the system solve it for you</a:t>
+              <a:t>If you have failed several times, you can let the system solve it for you</a:t>
             </a:r>
             <a:endParaRPr lang="en-US" sz="2000" dirty="0">
               <a:solidFill>
@@ -11396,7 +11585,7 @@
           <p:nvPr/>
         </p:nvPicPr>
         <p:blipFill>
-          <a:blip r:embed="rId3">
+          <a:blip r:embed="rId4">
             <a:extLst>
               <a:ext uri="{28A0092B-C50C-407E-A947-70E740481C1C}">
                 <a14:useLocalDpi xmlns:a14="http://schemas.microsoft.com/office/drawing/2010/main" val="0"/>
@@ -11422,14 +11611,14 @@
           </a:ln>
           <a:effectLst/>
           <a:extLst>
-            <a:ext uri="{909E8E84-426E-40DD-AFC4-6F175D3DCCD1}">
+            <a:ext uri="{909E8E84-426E-40dd-AFC4-6F175D3DCCD1}">
               <a14:hiddenFill xmlns:a14="http://schemas.microsoft.com/office/drawing/2010/main">
                 <a:solidFill>
                   <a:schemeClr val="accent1"/>
                 </a:solidFill>
               </a14:hiddenFill>
             </a:ext>
-            <a:ext uri="{91240B29-F687-4F45-9708-019B960494DF}">
+            <a:ext uri="{91240B29-F687-4f45-9708-019B960494DF}">
               <a14:hiddenLine xmlns:a14="http://schemas.microsoft.com/office/drawing/2010/main" w="9525">
                 <a:solidFill>
                   <a:schemeClr val="tx1"/>
@@ -11439,7 +11628,7 @@
                 <a:tailEnd/>
               </a14:hiddenLine>
             </a:ext>
-            <a:ext uri="{AF507438-7753-43E0-B8FC-AC1667EBCBE1}">
+            <a:ext uri="{AF507438-7753-43e0-B8FC-AC1667EBCBE1}">
               <a14:hiddenEffects xmlns:a14="http://schemas.microsoft.com/office/drawing/2010/main">
                 <a:effectLst>
                   <a:outerShdw dist="35921" dir="2700000" algn="ctr" rotWithShape="0">
@@ -11460,7 +11649,7 @@
         <p:spPr>
           <a:xfrm>
             <a:off x="4750995" y="5186642"/>
-            <a:ext cx="3831771" cy="1507486"/>
+            <a:ext cx="3964011" cy="1507486"/>
           </a:xfrm>
           <a:prstGeom prst="wedgeRoundRectCallout">
             <a:avLst>
@@ -11495,7 +11684,15 @@
                   <a:schemeClr val="tx1"/>
                 </a:solidFill>
               </a:rPr>
-              <a:t>“Solve </a:t>
+              <a:t>“Solve it for me” turns parts of the </a:t>
+            </a:r>
+            <a:r>
+              <a:rPr lang="en-US" sz="2000" dirty="0">
+                <a:solidFill>
+                  <a:schemeClr val="tx1"/>
+                </a:solidFill>
+              </a:rPr>
+              <a:t>node </a:t>
             </a:r>
             <a:r>
               <a:rPr lang="en-US" sz="2000" dirty="0" smtClean="0">
@@ -11503,7 +11700,15 @@
                   <a:schemeClr val="tx1"/>
                 </a:solidFill>
               </a:rPr>
-              <a:t>it for me</a:t>
+              <a:t>yellow.  Study </a:t>
+            </a:r>
+            <a:r>
+              <a:rPr lang="en-US" sz="2000" dirty="0">
+                <a:solidFill>
+                  <a:schemeClr val="tx1"/>
+                </a:solidFill>
+              </a:rPr>
+              <a:t>the correct answer </a:t>
             </a:r>
             <a:r>
               <a:rPr lang="en-US" sz="2000" dirty="0" smtClean="0">
@@ -11511,7 +11716,15 @@
                   <a:schemeClr val="tx1"/>
                 </a:solidFill>
               </a:rPr>
-              <a:t>” turns </a:t>
+              <a:t>so you can </a:t>
+            </a:r>
+            <a:r>
+              <a:rPr lang="en-US" sz="2000" dirty="0">
+                <a:solidFill>
+                  <a:schemeClr val="tx1"/>
+                </a:solidFill>
+              </a:rPr>
+              <a:t>do it </a:t>
             </a:r>
             <a:r>
               <a:rPr lang="en-US" sz="2000" dirty="0" smtClean="0">
@@ -11519,7 +11732,15 @@
                   <a:schemeClr val="tx1"/>
                 </a:solidFill>
               </a:rPr>
-              <a:t>parts of the node </a:t>
+              <a:t>on your own next </a:t>
+            </a:r>
+            <a:r>
+              <a:rPr lang="en-US" sz="2000" dirty="0">
+                <a:solidFill>
+                  <a:schemeClr val="tx1"/>
+                </a:solidFill>
+              </a:rPr>
+              <a:t>time</a:t>
             </a:r>
             <a:r>
               <a:rPr lang="en-US" sz="2000" dirty="0" smtClean="0">
@@ -11527,31 +11748,7 @@
                   <a:schemeClr val="tx1"/>
                 </a:solidFill>
               </a:rPr>
-              <a:t>a yellow</a:t>
-            </a:r>
-            <a:r>
-              <a:rPr lang="en-US" sz="2000" dirty="0" smtClean="0">
-                <a:solidFill>
-                  <a:schemeClr val="tx1"/>
-                </a:solidFill>
-              </a:rPr>
-              <a:t>, so study the correct answer and figure out how to do it </a:t>
-            </a:r>
-            <a:r>
-              <a:rPr lang="en-US" sz="2000" dirty="0" smtClean="0">
-                <a:solidFill>
-                  <a:schemeClr val="tx1"/>
-                </a:solidFill>
-              </a:rPr>
-              <a:t>avoid using it next </a:t>
-            </a:r>
-            <a:r>
-              <a:rPr lang="en-US" sz="2000" dirty="0" smtClean="0">
-                <a:solidFill>
-                  <a:schemeClr val="tx1"/>
-                </a:solidFill>
-              </a:rPr>
-              <a:t>time.</a:t>
+              <a:t>.</a:t>
             </a:r>
           </a:p>
         </p:txBody>
@@ -11645,14 +11842,14 @@
           </a:ln>
           <a:effectLst/>
           <a:extLst>
-            <a:ext uri="{909E8E84-426E-40DD-AFC4-6F175D3DCCD1}">
+            <a:ext uri="{909E8E84-426E-40dd-AFC4-6F175D3DCCD1}">
               <a14:hiddenFill xmlns:a14="http://schemas.microsoft.com/office/drawing/2010/main">
                 <a:solidFill>
                   <a:schemeClr val="accent1"/>
                 </a:solidFill>
               </a14:hiddenFill>
             </a:ext>
-            <a:ext uri="{91240B29-F687-4F45-9708-019B960494DF}">
+            <a:ext uri="{91240B29-F687-4f45-9708-019B960494DF}">
               <a14:hiddenLine xmlns:a14="http://schemas.microsoft.com/office/drawing/2010/main" w="9525">
                 <a:solidFill>
                   <a:schemeClr val="tx1"/>
@@ -11662,7 +11859,7 @@
                 <a:tailEnd/>
               </a14:hiddenLine>
             </a:ext>
-            <a:ext uri="{AF507438-7753-43E0-B8FC-AC1667EBCBE1}">
+            <a:ext uri="{AF507438-7753-43e0-B8FC-AC1667EBCBE1}">
               <a14:hiddenEffects xmlns:a14="http://schemas.microsoft.com/office/drawing/2010/main">
                 <a:effectLst>
                   <a:outerShdw dist="35921" dir="2700000" algn="ctr" rotWithShape="0">
@@ -11976,14 +12173,14 @@
           </a:ln>
           <a:effectLst/>
           <a:extLst>
-            <a:ext uri="{909E8E84-426E-40DD-AFC4-6F175D3DCCD1}">
+            <a:ext uri="{909E8E84-426E-40dd-AFC4-6F175D3DCCD1}">
               <a14:hiddenFill xmlns:a14="http://schemas.microsoft.com/office/drawing/2010/main">
                 <a:solidFill>
                   <a:schemeClr val="accent1"/>
                 </a:solidFill>
               </a14:hiddenFill>
             </a:ext>
-            <a:ext uri="{91240B29-F687-4F45-9708-019B960494DF}">
+            <a:ext uri="{91240B29-F687-4f45-9708-019B960494DF}">
               <a14:hiddenLine xmlns:a14="http://schemas.microsoft.com/office/drawing/2010/main" w="9525">
                 <a:solidFill>
                   <a:schemeClr val="tx1"/>
@@ -11993,7 +12190,7 @@
                 <a:tailEnd/>
               </a14:hiddenLine>
             </a:ext>
-            <a:ext uri="{AF507438-7753-43E0-B8FC-AC1667EBCBE1}">
+            <a:ext uri="{AF507438-7753-43e0-B8FC-AC1667EBCBE1}">
               <a14:hiddenEffects xmlns:a14="http://schemas.microsoft.com/office/drawing/2010/main">
                 <a:effectLst>
                   <a:outerShdw dist="35921" dir="2700000" algn="ctr" rotWithShape="0">
@@ -12273,14 +12470,14 @@
           </a:ln>
           <a:effectLst/>
           <a:extLst>
-            <a:ext uri="{909E8E84-426E-40DD-AFC4-6F175D3DCCD1}">
+            <a:ext uri="{909E8E84-426E-40dd-AFC4-6F175D3DCCD1}">
               <a14:hiddenFill xmlns:a14="http://schemas.microsoft.com/office/drawing/2010/main">
                 <a:solidFill>
                   <a:schemeClr val="accent1"/>
                 </a:solidFill>
               </a14:hiddenFill>
             </a:ext>
-            <a:ext uri="{91240B29-F687-4F45-9708-019B960494DF}">
+            <a:ext uri="{91240B29-F687-4f45-9708-019B960494DF}">
               <a14:hiddenLine xmlns:a14="http://schemas.microsoft.com/office/drawing/2010/main" w="9525">
                 <a:solidFill>
                   <a:schemeClr val="tx1"/>
@@ -12290,7 +12487,7 @@
                 <a:tailEnd/>
               </a14:hiddenLine>
             </a:ext>
-            <a:ext uri="{AF507438-7753-43E0-B8FC-AC1667EBCBE1}">
+            <a:ext uri="{AF507438-7753-43e0-B8FC-AC1667EBCBE1}">
               <a14:hiddenEffects xmlns:a14="http://schemas.microsoft.com/office/drawing/2010/main">
                 <a:effectLst>
                   <a:outerShdw dist="35921" dir="2700000" algn="ctr" rotWithShape="0">
@@ -12758,14 +12955,14 @@
           </a:ln>
           <a:effectLst/>
           <a:extLst>
-            <a:ext uri="{909E8E84-426E-40DD-AFC4-6F175D3DCCD1}">
+            <a:ext uri="{909E8E84-426E-40dd-AFC4-6F175D3DCCD1}">
               <a14:hiddenFill xmlns:a14="http://schemas.microsoft.com/office/drawing/2010/main">
                 <a:solidFill>
                   <a:schemeClr val="accent1"/>
                 </a:solidFill>
               </a14:hiddenFill>
             </a:ext>
-            <a:ext uri="{91240B29-F687-4F45-9708-019B960494DF}">
+            <a:ext uri="{91240B29-F687-4f45-9708-019B960494DF}">
               <a14:hiddenLine xmlns:a14="http://schemas.microsoft.com/office/drawing/2010/main" w="9525">
                 <a:solidFill>
                   <a:schemeClr val="tx1"/>
@@ -12775,7 +12972,7 @@
                 <a:tailEnd/>
               </a14:hiddenLine>
             </a:ext>
-            <a:ext uri="{AF507438-7753-43E0-B8FC-AC1667EBCBE1}">
+            <a:ext uri="{AF507438-7753-43e0-B8FC-AC1667EBCBE1}">
               <a14:hiddenEffects xmlns:a14="http://schemas.microsoft.com/office/drawing/2010/main">
                 <a:effectLst>
                   <a:outerShdw dist="35921" dir="2700000" algn="ctr" rotWithShape="0">
@@ -13398,7 +13595,7 @@
   <p:timing>
     <p:tnLst>
       <p:par>
-        <p:cTn id="1" dur="indefinite" restart="never" nodeType="tmRoot"/>
+        <p:cTn xmlns:p14="http://schemas.microsoft.com/office/powerpoint/2010/main" id="1" dur="indefinite" restart="never" nodeType="tmRoot"/>
       </p:par>
     </p:tnLst>
   </p:timing>
@@ -13719,14 +13916,14 @@
           </a:ln>
           <a:effectLst/>
           <a:extLst>
-            <a:ext uri="{909E8E84-426E-40DD-AFC4-6F175D3DCCD1}">
+            <a:ext uri="{909E8E84-426E-40dd-AFC4-6F175D3DCCD1}">
               <a14:hiddenFill xmlns:a14="http://schemas.microsoft.com/office/drawing/2010/main">
                 <a:solidFill>
                   <a:schemeClr val="accent1"/>
                 </a:solidFill>
               </a14:hiddenFill>
             </a:ext>
-            <a:ext uri="{91240B29-F687-4F45-9708-019B960494DF}">
+            <a:ext uri="{91240B29-F687-4f45-9708-019B960494DF}">
               <a14:hiddenLine xmlns:a14="http://schemas.microsoft.com/office/drawing/2010/main" w="9525">
                 <a:solidFill>
                   <a:schemeClr val="tx1"/>
@@ -13736,7 +13933,7 @@
                 <a:tailEnd/>
               </a14:hiddenLine>
             </a:ext>
-            <a:ext uri="{AF507438-7753-43E0-B8FC-AC1667EBCBE1}">
+            <a:ext uri="{AF507438-7753-43e0-B8FC-AC1667EBCBE1}">
               <a14:hiddenEffects xmlns:a14="http://schemas.microsoft.com/office/drawing/2010/main">
                 <a:effectLst>
                   <a:outerShdw dist="35921" dir="2700000" algn="ctr" rotWithShape="0">
@@ -14039,14 +14236,14 @@
           </a:ln>
           <a:effectLst/>
           <a:extLst>
-            <a:ext uri="{909E8E84-426E-40DD-AFC4-6F175D3DCCD1}">
+            <a:ext uri="{909E8E84-426E-40dd-AFC4-6F175D3DCCD1}">
               <a14:hiddenFill xmlns:a14="http://schemas.microsoft.com/office/drawing/2010/main">
                 <a:solidFill>
                   <a:schemeClr val="accent1"/>
                 </a:solidFill>
               </a14:hiddenFill>
             </a:ext>
-            <a:ext uri="{91240B29-F687-4F45-9708-019B960494DF}">
+            <a:ext uri="{91240B29-F687-4f45-9708-019B960494DF}">
               <a14:hiddenLine xmlns:a14="http://schemas.microsoft.com/office/drawing/2010/main" w="9525">
                 <a:solidFill>
                   <a:schemeClr val="tx1"/>
@@ -14056,7 +14253,7 @@
                 <a:tailEnd/>
               </a14:hiddenLine>
             </a:ext>
-            <a:ext uri="{AF507438-7753-43E0-B8FC-AC1667EBCBE1}">
+            <a:ext uri="{AF507438-7753-43e0-B8FC-AC1667EBCBE1}">
               <a14:hiddenEffects xmlns:a14="http://schemas.microsoft.com/office/drawing/2010/main">
                 <a:effectLst>
                   <a:outerShdw dist="35921" dir="2700000" algn="ctr" rotWithShape="0">
@@ -16491,7 +16688,7 @@
   <p:timing>
     <p:tnLst>
       <p:par>
-        <p:cTn id="1" dur="indefinite" restart="never" nodeType="tmRoot"/>
+        <p:cTn xmlns:p14="http://schemas.microsoft.com/office/powerpoint/2010/main" id="1" dur="indefinite" restart="never" nodeType="tmRoot"/>
       </p:par>
     </p:tnLst>
   </p:timing>
@@ -16664,7 +16861,7 @@
   <p:timing>
     <p:tnLst>
       <p:par>
-        <p:cTn id="1" dur="indefinite" restart="never" nodeType="tmRoot"/>
+        <p:cTn xmlns:p14="http://schemas.microsoft.com/office/powerpoint/2010/main" id="1" dur="indefinite" restart="never" nodeType="tmRoot"/>
       </p:par>
     </p:tnLst>
   </p:timing>
@@ -17163,14 +17360,14 @@
           </a:ln>
           <a:effectLst/>
           <a:extLst>
-            <a:ext uri="{909E8E84-426E-40DD-AFC4-6F175D3DCCD1}">
+            <a:ext uri="{909E8E84-426E-40dd-AFC4-6F175D3DCCD1}">
               <a14:hiddenFill xmlns:a14="http://schemas.microsoft.com/office/drawing/2010/main">
                 <a:solidFill>
                   <a:schemeClr val="accent1"/>
                 </a:solidFill>
               </a14:hiddenFill>
             </a:ext>
-            <a:ext uri="{91240B29-F687-4F45-9708-019B960494DF}">
+            <a:ext uri="{91240B29-F687-4f45-9708-019B960494DF}">
               <a14:hiddenLine xmlns:a14="http://schemas.microsoft.com/office/drawing/2010/main" w="9525">
                 <a:solidFill>
                   <a:schemeClr val="tx1"/>
@@ -17180,7 +17377,7 @@
                 <a:tailEnd/>
               </a14:hiddenLine>
             </a:ext>
-            <a:ext uri="{AF507438-7753-43E0-B8FC-AC1667EBCBE1}">
+            <a:ext uri="{AF507438-7753-43e0-B8FC-AC1667EBCBE1}">
               <a14:hiddenEffects xmlns:a14="http://schemas.microsoft.com/office/drawing/2010/main">
                 <a:effectLst>
                   <a:outerShdw dist="35921" dir="2700000" algn="ctr" rotWithShape="0">
@@ -17929,14 +18126,14 @@
           </a:ln>
           <a:effectLst/>
           <a:extLst>
-            <a:ext uri="{909E8E84-426E-40DD-AFC4-6F175D3DCCD1}">
+            <a:ext uri="{909E8E84-426E-40dd-AFC4-6F175D3DCCD1}">
               <a14:hiddenFill xmlns:a14="http://schemas.microsoft.com/office/drawing/2010/main">
                 <a:solidFill>
                   <a:schemeClr val="accent1"/>
                 </a:solidFill>
               </a14:hiddenFill>
             </a:ext>
-            <a:ext uri="{91240B29-F687-4F45-9708-019B960494DF}">
+            <a:ext uri="{91240B29-F687-4f45-9708-019B960494DF}">
               <a14:hiddenLine xmlns:a14="http://schemas.microsoft.com/office/drawing/2010/main" w="9525">
                 <a:solidFill>
                   <a:schemeClr val="tx1"/>
@@ -17946,7 +18143,7 @@
                 <a:tailEnd/>
               </a14:hiddenLine>
             </a:ext>
-            <a:ext uri="{AF507438-7753-43E0-B8FC-AC1667EBCBE1}">
+            <a:ext uri="{AF507438-7753-43e0-B8FC-AC1667EBCBE1}">
               <a14:hiddenEffects xmlns:a14="http://schemas.microsoft.com/office/drawing/2010/main">
                 <a:effectLst>
                   <a:outerShdw dist="35921" dir="2700000" algn="ctr" rotWithShape="0">
@@ -18286,14 +18483,14 @@
           </a:ln>
           <a:effectLst/>
           <a:extLst>
-            <a:ext uri="{909E8E84-426E-40DD-AFC4-6F175D3DCCD1}">
+            <a:ext uri="{909E8E84-426E-40dd-AFC4-6F175D3DCCD1}">
               <a14:hiddenFill xmlns:a14="http://schemas.microsoft.com/office/drawing/2010/main">
                 <a:solidFill>
                   <a:schemeClr val="accent1"/>
                 </a:solidFill>
               </a14:hiddenFill>
             </a:ext>
-            <a:ext uri="{91240B29-F687-4F45-9708-019B960494DF}">
+            <a:ext uri="{91240B29-F687-4f45-9708-019B960494DF}">
               <a14:hiddenLine xmlns:a14="http://schemas.microsoft.com/office/drawing/2010/main" w="9525">
                 <a:solidFill>
                   <a:schemeClr val="tx1"/>
@@ -18303,7 +18500,7 @@
                 <a:tailEnd/>
               </a14:hiddenLine>
             </a:ext>
-            <a:ext uri="{AF507438-7753-43E0-B8FC-AC1667EBCBE1}">
+            <a:ext uri="{AF507438-7753-43e0-B8FC-AC1667EBCBE1}">
               <a14:hiddenEffects xmlns:a14="http://schemas.microsoft.com/office/drawing/2010/main">
                 <a:effectLst>
                   <a:outerShdw dist="35921" dir="2700000" algn="ctr" rotWithShape="0">
@@ -18832,14 +19029,14 @@
           </a:ln>
           <a:effectLst/>
           <a:extLst>
-            <a:ext uri="{909E8E84-426E-40DD-AFC4-6F175D3DCCD1}">
+            <a:ext uri="{909E8E84-426E-40dd-AFC4-6F175D3DCCD1}">
               <a14:hiddenFill xmlns:a14="http://schemas.microsoft.com/office/drawing/2010/main">
                 <a:solidFill>
                   <a:schemeClr val="accent1"/>
                 </a:solidFill>
               </a14:hiddenFill>
             </a:ext>
-            <a:ext uri="{91240B29-F687-4F45-9708-019B960494DF}">
+            <a:ext uri="{91240B29-F687-4f45-9708-019B960494DF}">
               <a14:hiddenLine xmlns:a14="http://schemas.microsoft.com/office/drawing/2010/main" w="9525">
                 <a:solidFill>
                   <a:schemeClr val="tx1"/>
@@ -18849,7 +19046,7 @@
                 <a:tailEnd/>
               </a14:hiddenLine>
             </a:ext>
-            <a:ext uri="{AF507438-7753-43E0-B8FC-AC1667EBCBE1}">
+            <a:ext uri="{AF507438-7753-43e0-B8FC-AC1667EBCBE1}">
               <a14:hiddenEffects xmlns:a14="http://schemas.microsoft.com/office/drawing/2010/main">
                 <a:effectLst>
                   <a:outerShdw dist="35921" dir="2700000" algn="ctr" rotWithShape="0">
@@ -20673,7 +20870,7 @@
   <p:timing>
     <p:tnLst>
       <p:par>
-        <p:cTn id="1" dur="indefinite" restart="never" nodeType="tmRoot"/>
+        <p:cTn xmlns:p14="http://schemas.microsoft.com/office/powerpoint/2010/main" id="1" dur="indefinite" restart="never" nodeType="tmRoot"/>
       </p:par>
     </p:tnLst>
   </p:timing>
@@ -21350,7 +21547,7 @@
   <p:timing>
     <p:tnLst>
       <p:par>
-        <p:cTn id="1" dur="indefinite" restart="never" nodeType="tmRoot"/>
+        <p:cTn xmlns:p14="http://schemas.microsoft.com/office/powerpoint/2010/main" id="1" dur="indefinite" restart="never" nodeType="tmRoot"/>
       </p:par>
     </p:tnLst>
   </p:timing>
@@ -21493,7 +21690,7 @@
   <p:timing>
     <p:tnLst>
       <p:par>
-        <p:cTn id="1" dur="indefinite" restart="never" nodeType="tmRoot"/>
+        <p:cTn xmlns:p14="http://schemas.microsoft.com/office/powerpoint/2010/main" id="1" dur="indefinite" restart="never" nodeType="tmRoot"/>
       </p:par>
     </p:tnLst>
   </p:timing>
@@ -21994,14 +22191,14 @@
           </a:ln>
           <a:effectLst/>
           <a:extLst>
-            <a:ext uri="{909E8E84-426E-40DD-AFC4-6F175D3DCCD1}">
+            <a:ext uri="{909E8E84-426E-40dd-AFC4-6F175D3DCCD1}">
               <a14:hiddenFill xmlns:a14="http://schemas.microsoft.com/office/drawing/2010/main">
                 <a:solidFill>
                   <a:schemeClr val="accent1"/>
                 </a:solidFill>
               </a14:hiddenFill>
             </a:ext>
-            <a:ext uri="{91240B29-F687-4F45-9708-019B960494DF}">
+            <a:ext uri="{91240B29-F687-4f45-9708-019B960494DF}">
               <a14:hiddenLine xmlns:a14="http://schemas.microsoft.com/office/drawing/2010/main" w="9525">
                 <a:solidFill>
                   <a:schemeClr val="tx1"/>
@@ -22011,7 +22208,7 @@
                 <a:tailEnd/>
               </a14:hiddenLine>
             </a:ext>
-            <a:ext uri="{AF507438-7753-43E0-B8FC-AC1667EBCBE1}">
+            <a:ext uri="{AF507438-7753-43e0-B8FC-AC1667EBCBE1}">
               <a14:hiddenEffects xmlns:a14="http://schemas.microsoft.com/office/drawing/2010/main">
                 <a:effectLst>
                   <a:outerShdw dist="35921" dir="2700000" algn="ctr" rotWithShape="0">
@@ -22778,14 +22975,14 @@
           </a:ln>
           <a:effectLst/>
           <a:extLst>
-            <a:ext uri="{909E8E84-426E-40DD-AFC4-6F175D3DCCD1}">
+            <a:ext uri="{909E8E84-426E-40dd-AFC4-6F175D3DCCD1}">
               <a14:hiddenFill xmlns:a14="http://schemas.microsoft.com/office/drawing/2010/main">
                 <a:solidFill>
                   <a:schemeClr val="accent1"/>
                 </a:solidFill>
               </a14:hiddenFill>
             </a:ext>
-            <a:ext uri="{91240B29-F687-4F45-9708-019B960494DF}">
+            <a:ext uri="{91240B29-F687-4f45-9708-019B960494DF}">
               <a14:hiddenLine xmlns:a14="http://schemas.microsoft.com/office/drawing/2010/main" w="9525">
                 <a:solidFill>
                   <a:schemeClr val="tx1"/>
@@ -22795,7 +22992,7 @@
                 <a:tailEnd/>
               </a14:hiddenLine>
             </a:ext>
-            <a:ext uri="{AF507438-7753-43E0-B8FC-AC1667EBCBE1}">
+            <a:ext uri="{AF507438-7753-43e0-B8FC-AC1667EBCBE1}">
               <a14:hiddenEffects xmlns:a14="http://schemas.microsoft.com/office/drawing/2010/main">
                 <a:effectLst>
                   <a:outerShdw dist="35921" dir="2700000" algn="ctr" rotWithShape="0">
@@ -23128,14 +23325,14 @@
           </a:ln>
           <a:effectLst/>
           <a:extLst>
-            <a:ext uri="{909E8E84-426E-40DD-AFC4-6F175D3DCCD1}">
+            <a:ext uri="{909E8E84-426E-40dd-AFC4-6F175D3DCCD1}">
               <a14:hiddenFill xmlns:a14="http://schemas.microsoft.com/office/drawing/2010/main">
                 <a:solidFill>
                   <a:schemeClr val="accent1"/>
                 </a:solidFill>
               </a14:hiddenFill>
             </a:ext>
-            <a:ext uri="{91240B29-F687-4F45-9708-019B960494DF}">
+            <a:ext uri="{91240B29-F687-4f45-9708-019B960494DF}">
               <a14:hiddenLine xmlns:a14="http://schemas.microsoft.com/office/drawing/2010/main" w="9525">
                 <a:solidFill>
                   <a:schemeClr val="tx1"/>
@@ -23145,7 +23342,7 @@
                 <a:tailEnd/>
               </a14:hiddenLine>
             </a:ext>
-            <a:ext uri="{AF507438-7753-43E0-B8FC-AC1667EBCBE1}">
+            <a:ext uri="{AF507438-7753-43e0-B8FC-AC1667EBCBE1}">
               <a14:hiddenEffects xmlns:a14="http://schemas.microsoft.com/office/drawing/2010/main">
                 <a:effectLst>
                   <a:outerShdw dist="35921" dir="2700000" algn="ctr" rotWithShape="0">
@@ -23699,14 +23896,14 @@
           </a:ln>
           <a:effectLst/>
           <a:extLst>
-            <a:ext uri="{909E8E84-426E-40DD-AFC4-6F175D3DCCD1}">
+            <a:ext uri="{909E8E84-426E-40dd-AFC4-6F175D3DCCD1}">
               <a14:hiddenFill xmlns:a14="http://schemas.microsoft.com/office/drawing/2010/main">
                 <a:solidFill>
                   <a:schemeClr val="accent1"/>
                 </a:solidFill>
               </a14:hiddenFill>
             </a:ext>
-            <a:ext uri="{91240B29-F687-4F45-9708-019B960494DF}">
+            <a:ext uri="{91240B29-F687-4f45-9708-019B960494DF}">
               <a14:hiddenLine xmlns:a14="http://schemas.microsoft.com/office/drawing/2010/main" w="9525">
                 <a:solidFill>
                   <a:schemeClr val="tx1"/>
@@ -23716,7 +23913,7 @@
                 <a:tailEnd/>
               </a14:hiddenLine>
             </a:ext>
-            <a:ext uri="{AF507438-7753-43E0-B8FC-AC1667EBCBE1}">
+            <a:ext uri="{AF507438-7753-43e0-B8FC-AC1667EBCBE1}">
               <a14:hiddenEffects xmlns:a14="http://schemas.microsoft.com/office/drawing/2010/main">
                 <a:effectLst>
                   <a:outerShdw dist="35921" dir="2700000" algn="ctr" rotWithShape="0">
@@ -25439,7 +25636,7 @@
   <p:timing>
     <p:tnLst>
       <p:par>
-        <p:cTn id="1" dur="indefinite" restart="never" nodeType="tmRoot"/>
+        <p:cTn xmlns:p14="http://schemas.microsoft.com/office/powerpoint/2010/main" id="1" dur="indefinite" restart="never" nodeType="tmRoot"/>
       </p:par>
     </p:tnLst>
   </p:timing>
@@ -26056,7 +26253,7 @@
   <p:timing>
     <p:tnLst>
       <p:par>
-        <p:cTn id="1" dur="indefinite" restart="never" nodeType="tmRoot"/>
+        <p:cTn xmlns:p14="http://schemas.microsoft.com/office/powerpoint/2010/main" id="1" dur="indefinite" restart="never" nodeType="tmRoot"/>
       </p:par>
     </p:tnLst>
   </p:timing>
@@ -27654,14 +27851,14 @@
           </a:ln>
           <a:effectLst/>
           <a:extLst>
-            <a:ext uri="{909E8E84-426E-40DD-AFC4-6F175D3DCCD1}">
+            <a:ext uri="{909E8E84-426E-40dd-AFC4-6F175D3DCCD1}">
               <a14:hiddenFill xmlns:a14="http://schemas.microsoft.com/office/drawing/2010/main">
                 <a:solidFill>
                   <a:schemeClr val="accent1"/>
                 </a:solidFill>
               </a14:hiddenFill>
             </a:ext>
-            <a:ext uri="{91240B29-F687-4F45-9708-019B960494DF}">
+            <a:ext uri="{91240B29-F687-4f45-9708-019B960494DF}">
               <a14:hiddenLine xmlns:a14="http://schemas.microsoft.com/office/drawing/2010/main" w="9525">
                 <a:solidFill>
                   <a:schemeClr val="tx1"/>
@@ -27671,7 +27868,7 @@
                 <a:tailEnd/>
               </a14:hiddenLine>
             </a:ext>
-            <a:ext uri="{AF507438-7753-43E0-B8FC-AC1667EBCBE1}">
+            <a:ext uri="{AF507438-7753-43e0-B8FC-AC1667EBCBE1}">
               <a14:hiddenEffects xmlns:a14="http://schemas.microsoft.com/office/drawing/2010/main">
                 <a:effectLst>
                   <a:outerShdw dist="35921" dir="2700000" algn="ctr" rotWithShape="0">
@@ -29386,7 +29583,7 @@
   <p:timing>
     <p:tnLst>
       <p:par>
-        <p:cTn id="1" dur="indefinite" restart="never" nodeType="tmRoot"/>
+        <p:cTn xmlns:p14="http://schemas.microsoft.com/office/powerpoint/2010/main" id="1" dur="indefinite" restart="never" nodeType="tmRoot"/>
       </p:par>
     </p:tnLst>
   </p:timing>
@@ -32189,7 +32386,7 @@
   <p:timing>
     <p:tnLst>
       <p:par>
-        <p:cTn id="1" dur="indefinite" restart="never" nodeType="tmRoot"/>
+        <p:cTn xmlns:p14="http://schemas.microsoft.com/office/powerpoint/2010/main" id="1" dur="indefinite" restart="never" nodeType="tmRoot"/>
       </p:par>
     </p:tnLst>
   </p:timing>
@@ -33117,7 +33314,7 @@
   <p:timing>
     <p:tnLst>
       <p:par>
-        <p:cTn id="1" dur="indefinite" restart="never" nodeType="tmRoot"/>
+        <p:cTn xmlns:p14="http://schemas.microsoft.com/office/powerpoint/2010/main" id="1" dur="indefinite" restart="never" nodeType="tmRoot"/>
       </p:par>
     </p:tnLst>
   </p:timing>

</xml_diff>

<commit_message>
Fix slides 27,28,35,45.  Fixes Bugs 1975,1976,1978,1982
</commit_message>
<xml_diff>
--- a/help/InstructionTabSlides_v25.pptx
+++ b/help/InstructionTabSlides_v25.pptx
@@ -601,12 +601,12 @@
               <a:defRPr/>
             </a:pPr>
             <a:r>
-              <a:rPr lang="en-US" smtClean="0"/>
+              <a:rPr lang="en-US" dirty="0" smtClean="0"/>
               <a:t>Save as 567x425 pixels.</a:t>
             </a:r>
           </a:p>
           <a:p>
-            <a:endParaRPr lang="en-US"/>
+            <a:endParaRPr lang="en-US" dirty="0"/>
           </a:p>
         </p:txBody>
       </p:sp>
@@ -12458,7 +12458,7 @@
         </p:blipFill>
         <p:spPr bwMode="auto">
           <a:xfrm>
-            <a:off x="3286760" y="1215349"/>
+            <a:off x="3381344" y="1134289"/>
             <a:ext cx="5400040" cy="5498822"/>
           </a:xfrm>
           <a:prstGeom prst="rect">
@@ -12649,8 +12649,8 @@
         </p:nvSpPr>
         <p:spPr>
           <a:xfrm>
-            <a:off x="296686" y="1730745"/>
-            <a:ext cx="2671359" cy="4468031"/>
+            <a:off x="296685" y="1513117"/>
+            <a:ext cx="2932595" cy="4685660"/>
           </a:xfrm>
           <a:prstGeom prst="wedgeRoundRectCallout">
             <a:avLst>
@@ -12680,41 +12680,75 @@
           <a:p>
             <a:r>
               <a:rPr lang="en-US" sz="2000" dirty="0" smtClean="0"/>
-              <a:t>As described in the situation tab, the problem “</a:t>
-            </a:r>
-            <a:r>
-              <a:rPr lang="fr-FR" dirty="0" smtClean="0"/>
+              <a:t>Because</a:t>
+            </a:r>
+            <a:r>
+              <a:rPr lang="en-US" sz="2000" dirty="0" smtClean="0"/>
+              <a:t> </a:t>
+            </a:r>
+            <a:r>
+              <a:rPr lang="en-US" sz="2000" dirty="0" smtClean="0"/>
+              <a:t>the situation </a:t>
+            </a:r>
+            <a:r>
+              <a:rPr lang="en-US" sz="2000" dirty="0" smtClean="0"/>
+              <a:t>tab</a:t>
+            </a:r>
+            <a:r>
+              <a:rPr lang="en-US" sz="2000" dirty="0"/>
+              <a:t> </a:t>
+            </a:r>
+            <a:r>
+              <a:rPr lang="en-US" sz="2000" dirty="0" smtClean="0"/>
+              <a:t>says,</a:t>
+            </a:r>
+            <a:r>
+              <a:rPr lang="en-US" sz="2000" dirty="0" smtClean="0"/>
+              <a:t> </a:t>
+            </a:r>
+            <a:r>
+              <a:rPr lang="en-US" sz="2000" dirty="0" smtClean="0"/>
+              <a:t>“</a:t>
+            </a:r>
+            <a:r>
+              <a:rPr lang="fr-FR" sz="2000" dirty="0" smtClean="0"/>
               <a:t>By </a:t>
             </a:r>
             <a:r>
-              <a:rPr lang="fr-FR" dirty="0" err="1" smtClean="0"/>
+              <a:rPr lang="fr-FR" sz="2000" dirty="0" err="1" smtClean="0"/>
               <a:t>weight</a:t>
             </a:r>
             <a:r>
-              <a:rPr lang="fr-FR" dirty="0" smtClean="0"/>
+              <a:rPr lang="fr-FR" sz="2000" dirty="0" smtClean="0"/>
               <a:t>, </a:t>
             </a:r>
             <a:r>
-              <a:rPr lang="fr-FR" dirty="0" err="1" smtClean="0"/>
+              <a:rPr lang="fr-FR" sz="2000" dirty="0" err="1" smtClean="0"/>
               <a:t>potato</a:t>
             </a:r>
             <a:r>
-              <a:rPr lang="fr-FR" dirty="0" smtClean="0"/>
-              <a:t> chips are 35% fat.</a:t>
+              <a:rPr lang="fr-FR" sz="2000" dirty="0" smtClean="0"/>
+              <a:t> chips are 35% </a:t>
+            </a:r>
+            <a:r>
+              <a:rPr lang="fr-FR" sz="2000" dirty="0" smtClean="0"/>
+              <a:t>fat,</a:t>
             </a:r>
             <a:r>
               <a:rPr lang="en-US" sz="2000" dirty="0" smtClean="0"/>
-              <a:t>”. This number is fixed in time, you therefore have to select “fixed value”.</a:t>
-            </a:r>
-          </a:p>
-          <a:p>
+              <a:t>” you know that the value of the “fat content” is a </a:t>
+            </a:r>
+            <a:r>
+              <a:rPr lang="en-US" sz="2000" dirty="0" smtClean="0"/>
+              <a:t>fixed, given number, 0.35.</a:t>
+            </a:r>
+          </a:p>
+          <a:p>
+            <a:r>
+              <a:rPr lang="en-US" sz="2000" dirty="0" smtClean="0"/>
+              <a:t>As you will see in a moment, that establishes a plan for filling out the remaining tabs, inputs, and calculations.</a:t>
+            </a:r>
             <a:endParaRPr lang="en-US" sz="2000" dirty="0" smtClean="0"/>
-          </a:p>
-          <a:p>
-            <a:r>
-              <a:rPr lang="en-US" sz="2000" dirty="0" smtClean="0"/>
-              <a:t>Once you have filled up this tab, you can complete the inputs and calculation tab accordingly. </a:t>
-            </a:r>
           </a:p>
         </p:txBody>
       </p:sp>
@@ -12810,7 +12844,7 @@
         <p:spPr>
           <a:xfrm>
             <a:off x="405216" y="4102917"/>
-            <a:ext cx="8229600" cy="672186"/>
+            <a:ext cx="8229600" cy="1314582"/>
           </a:xfrm>
         </p:spPr>
         <p:txBody>
@@ -12836,8 +12870,25 @@
             </a:r>
             <a:r>
               <a:rPr lang="en-US" sz="2400" dirty="0" smtClean="0"/>
-              <a:t> allows you to define and modify the inputs to a node. You will eventually use these inputs in the calculation, but you have to get them right first.</a:t>
-            </a:r>
+              <a:t> allows you to </a:t>
+            </a:r>
+            <a:r>
+              <a:rPr lang="en-US" sz="2400" dirty="0" smtClean="0"/>
+              <a:t>define </a:t>
+            </a:r>
+            <a:r>
+              <a:rPr lang="en-US" sz="2400" dirty="0" smtClean="0"/>
+              <a:t>the </a:t>
+            </a:r>
+            <a:r>
+              <a:rPr lang="en-US" sz="2400" dirty="0"/>
+              <a:t>inputs to the calculation of this node's value before having to think about the mathematical details of the calculation </a:t>
+            </a:r>
+            <a:r>
+              <a:rPr lang="en-US" sz="2400" dirty="0" smtClean="0"/>
+              <a:t>itself.</a:t>
+            </a:r>
+            <a:endParaRPr lang="en-US" sz="2400" dirty="0" smtClean="0"/>
           </a:p>
         </p:txBody>
       </p:sp>
@@ -15256,15 +15307,39 @@
           <a:chExt cx="0" cy="0"/>
         </a:xfrm>
       </p:grpSpPr>
+      <p:sp>
+        <p:nvSpPr>
+          <p:cNvPr id="10" name="Slide Number Placeholder 9"/>
+          <p:cNvSpPr>
+            <a:spLocks noGrp="1"/>
+          </p:cNvSpPr>
+          <p:nvPr>
+            <p:ph type="sldNum" sz="quarter" idx="12"/>
+          </p:nvPr>
+        </p:nvSpPr>
+        <p:spPr/>
+        <p:txBody>
+          <a:bodyPr/>
+          <a:lstStyle/>
+          <a:p>
+            <a:fld id="{E4CAE1AF-AC0C-FB4E-AE67-19ACF9E285C5}" type="slidenum">
+              <a:rPr lang="en-US" smtClean="0"/>
+              <a:pPr/>
+              <a:t>35</a:t>
+            </a:fld>
+            <a:endParaRPr lang="en-US"/>
+          </a:p>
+        </p:txBody>
+      </p:sp>
       <p:pic>
         <p:nvPicPr>
-          <p:cNvPr id="24" name="Image 23"/>
+          <p:cNvPr id="8" name="Picture 2"/>
           <p:cNvPicPr>
-            <a:picLocks noChangeAspect="1"/>
+            <a:picLocks noChangeAspect="1" noChangeArrowheads="1"/>
           </p:cNvPicPr>
           <p:nvPr/>
         </p:nvPicPr>
-        <p:blipFill>
+        <p:blipFill rotWithShape="1">
           <a:blip r:embed="rId2">
             <a:extLst>
               <a:ext uri="{28A0092B-C50C-407E-A947-70E740481C1C}">
@@ -15272,154 +15347,66 @@
               </a:ext>
             </a:extLst>
           </a:blip>
-          <a:stretch>
-            <a:fillRect/>
-          </a:stretch>
+          <a:srcRect l="56619" b="48722"/>
+          <a:stretch/>
         </p:blipFill>
-        <p:spPr>
-          <a:xfrm>
-            <a:off x="1164909" y="3370403"/>
-            <a:ext cx="6551566" cy="464363"/>
+        <p:spPr bwMode="auto">
+          <a:xfrm>
+            <a:off x="4039978" y="3330214"/>
+            <a:ext cx="2499068" cy="2033246"/>
           </a:xfrm>
           <a:prstGeom prst="rect">
             <a:avLst/>
           </a:prstGeom>
+          <a:noFill/>
+          <a:ln w="9525">
+            <a:noFill/>
+            <a:miter lim="800000"/>
+            <a:headEnd/>
+            <a:tailEnd/>
+          </a:ln>
         </p:spPr>
       </p:pic>
       <p:sp>
         <p:nvSpPr>
-          <p:cNvPr id="10" name="Slide Number Placeholder 9"/>
-          <p:cNvSpPr>
-            <a:spLocks noGrp="1"/>
-          </p:cNvSpPr>
-          <p:nvPr>
-            <p:ph type="sldNum" sz="quarter" idx="12"/>
-          </p:nvPr>
-        </p:nvSpPr>
-        <p:spPr/>
-        <p:txBody>
-          <a:bodyPr/>
-          <a:lstStyle/>
-          <a:p>
-            <a:fld id="{E4CAE1AF-AC0C-FB4E-AE67-19ACF9E285C5}" type="slidenum">
-              <a:rPr lang="en-US" smtClean="0"/>
-              <a:pPr/>
-              <a:t>35</a:t>
-            </a:fld>
-            <a:endParaRPr lang="en-US"/>
-          </a:p>
-        </p:txBody>
-      </p:sp>
-      <p:sp>
-        <p:nvSpPr>
-          <p:cNvPr id="32" name="Content Placeholder 2"/>
-          <p:cNvSpPr>
-            <a:spLocks noGrp="1"/>
-          </p:cNvSpPr>
-          <p:nvPr>
-            <p:ph idx="1"/>
-          </p:nvPr>
-        </p:nvSpPr>
-        <p:spPr>
-          <a:xfrm>
-            <a:off x="341716" y="5044834"/>
-            <a:ext cx="8229600" cy="672186"/>
-          </a:xfrm>
-        </p:spPr>
-        <p:txBody>
-          <a:bodyPr>
-            <a:noAutofit/>
-          </a:bodyPr>
-          <a:lstStyle/>
-          <a:p>
-            <a:pPr>
-              <a:buNone/>
-            </a:pPr>
-            <a:r>
-              <a:rPr lang="en-US" sz="2400" dirty="0" smtClean="0"/>
-              <a:t>The </a:t>
-            </a:r>
-            <a:r>
-              <a:rPr lang="en-US" sz="2400" dirty="0" smtClean="0">
-                <a:solidFill>
-                  <a:srgbClr val="FF6600"/>
-                </a:solidFill>
-              </a:rPr>
-              <a:t>GRAPH TAB </a:t>
-            </a:r>
-            <a:r>
-              <a:rPr lang="en-US" sz="2400" dirty="0" smtClean="0"/>
-              <a:t>displays the evolution of the node’s quantity over time, and compares your node’s values to what they should in order to answer the problem.</a:t>
-            </a:r>
-          </a:p>
-        </p:txBody>
-      </p:sp>
-      <p:cxnSp>
-        <p:nvCxnSpPr>
-          <p:cNvPr id="25" name="Connecteur droit 24"/>
-          <p:cNvCxnSpPr/>
-          <p:nvPr/>
-        </p:nvCxnSpPr>
-        <p:spPr>
-          <a:xfrm flipV="1">
-            <a:off x="3978714" y="3834766"/>
-            <a:ext cx="349870" cy="1296963"/>
-          </a:xfrm>
-          <a:prstGeom prst="line">
-            <a:avLst/>
-          </a:prstGeom>
-          <a:ln>
-            <a:solidFill>
-              <a:srgbClr val="660066"/>
-            </a:solidFill>
-          </a:ln>
-        </p:spPr>
-        <p:style>
-          <a:lnRef idx="2">
-            <a:schemeClr val="accent1"/>
-          </a:lnRef>
-          <a:fillRef idx="0">
-            <a:schemeClr val="accent1"/>
-          </a:fillRef>
-          <a:effectRef idx="1">
-            <a:schemeClr val="accent1"/>
-          </a:effectRef>
-          <a:fontRef idx="minor">
-            <a:schemeClr val="tx1"/>
-          </a:fontRef>
-        </p:style>
-      </p:cxnSp>
-      <p:sp>
-        <p:nvSpPr>
-          <p:cNvPr id="23" name="Rounded Rectangular Callout 9"/>
+          <p:cNvPr id="12" name="Rounded Rectangular Callout 11"/>
           <p:cNvSpPr/>
           <p:nvPr/>
         </p:nvSpPr>
         <p:spPr>
           <a:xfrm>
-            <a:off x="225977" y="382844"/>
-            <a:ext cx="2133600" cy="2335827"/>
+            <a:off x="756652" y="1303532"/>
+            <a:ext cx="3256076" cy="1317404"/>
           </a:xfrm>
           <a:prstGeom prst="wedgeRoundRectCallout">
             <a:avLst>
-              <a:gd name="adj1" fmla="val 49332"/>
-              <a:gd name="adj2" fmla="val 19878"/>
+              <a:gd name="adj1" fmla="val 48735"/>
+              <a:gd name="adj2" fmla="val 109248"/>
               <a:gd name="adj3" fmla="val 16667"/>
             </a:avLst>
           </a:prstGeom>
+          <a:solidFill>
+            <a:srgbClr val="FFFF00"/>
+          </a:solidFill>
+          <a:ln>
+            <a:solidFill>
+              <a:schemeClr val="tx1"/>
+            </a:solidFill>
+          </a:ln>
+          <a:effectLst/>
         </p:spPr>
         <p:style>
           <a:lnRef idx="1">
-            <a:schemeClr val="accent4"/>
+            <a:schemeClr val="accent1"/>
           </a:lnRef>
-          <a:fillRef idx="2">
-            <a:schemeClr val="accent4"/>
+          <a:fillRef idx="3">
+            <a:schemeClr val="accent1"/>
           </a:fillRef>
-          <a:effectRef idx="1">
-            <a:schemeClr val="accent4"/>
+          <a:effectRef idx="2">
+            <a:schemeClr val="accent1"/>
           </a:effectRef>
           <a:fontRef idx="minor">
-            <a:schemeClr val="dk1"/>
+            <a:schemeClr val="lt1"/>
           </a:fontRef>
         </p:style>
         <p:txBody>
@@ -15428,37 +15415,18 @@
           <a:p>
             <a:pPr algn="ctr"/>
             <a:r>
-              <a:rPr lang="en-US" sz="2400" dirty="0" smtClean="0">
+              <a:rPr lang="en-US" sz="2400" dirty="0">
                 <a:solidFill>
                   <a:schemeClr val="tx1"/>
                 </a:solidFill>
               </a:rPr>
-              <a:t>Now that the model is run, you can access the graph tab</a:t>
+              <a:t>Double click on the node in order to open the node editor.</a:t>
             </a:r>
             <a:endParaRPr lang="en-US" sz="2400" dirty="0">
               <a:solidFill>
                 <a:schemeClr val="tx1"/>
               </a:solidFill>
             </a:endParaRPr>
-          </a:p>
-        </p:txBody>
-      </p:sp>
-      <p:sp>
-        <p:nvSpPr>
-          <p:cNvPr id="3" name="Title 2"/>
-          <p:cNvSpPr>
-            <a:spLocks noGrp="1"/>
-          </p:cNvSpPr>
-          <p:nvPr>
-            <p:ph type="title"/>
-          </p:nvPr>
-        </p:nvSpPr>
-        <p:spPr/>
-        <p:txBody>
-          <a:bodyPr/>
-          <a:lstStyle/>
-          <a:p>
-            <a:endParaRPr lang="en-US"/>
           </a:p>
         </p:txBody>
       </p:sp>
@@ -19090,7 +19058,7 @@
         </p:nvSpPr>
         <p:spPr>
           <a:xfrm>
-            <a:off x="221423" y="4003659"/>
+            <a:off x="221423" y="3760479"/>
             <a:ext cx="2514600" cy="1588194"/>
           </a:xfrm>
           <a:prstGeom prst="wedgeRoundRectCallout">
@@ -19222,8 +19190,8 @@
         </p:nvSpPr>
         <p:spPr>
           <a:xfrm>
-            <a:off x="0" y="2331117"/>
-            <a:ext cx="2442754" cy="402418"/>
+            <a:off x="351303" y="2479726"/>
+            <a:ext cx="2118474" cy="465447"/>
           </a:xfrm>
           <a:prstGeom prst="wedgeRoundRectCallout">
             <a:avLst>
@@ -19353,13 +19321,13 @@
         </p:nvSpPr>
         <p:spPr>
           <a:xfrm>
-            <a:off x="394753" y="6017931"/>
+            <a:off x="381241" y="5896341"/>
             <a:ext cx="2133600" cy="748937"/>
           </a:xfrm>
           <a:prstGeom prst="wedgeRoundRectCallout">
             <a:avLst>
-              <a:gd name="adj1" fmla="val 89102"/>
-              <a:gd name="adj2" fmla="val -47920"/>
+              <a:gd name="adj1" fmla="val 84669"/>
+              <a:gd name="adj2" fmla="val -38901"/>
               <a:gd name="adj3" fmla="val 16667"/>
             </a:avLst>
           </a:prstGeom>
@@ -19411,8 +19379,8 @@
         </p:nvSpPr>
         <p:spPr>
           <a:xfrm>
-            <a:off x="100509" y="155320"/>
-            <a:ext cx="1982761" cy="2095014"/>
+            <a:off x="276160" y="864637"/>
+            <a:ext cx="2101888" cy="1358675"/>
           </a:xfrm>
           <a:prstGeom prst="wedgeRoundRectCallout">
             <a:avLst>
@@ -19535,8 +19503,8 @@
         </p:nvSpPr>
         <p:spPr>
           <a:xfrm>
-            <a:off x="207073" y="3111807"/>
-            <a:ext cx="2514600" cy="2714214"/>
+            <a:off x="207073" y="3215373"/>
+            <a:ext cx="2514600" cy="2418285"/>
           </a:xfrm>
           <a:prstGeom prst="wedgeRoundRectCallout">
             <a:avLst>
@@ -19570,14 +19538,30 @@
           <a:p>
             <a:pPr algn="ctr"/>
             <a:r>
-              <a:rPr lang="en-US" sz="2400" dirty="0" smtClean="0">
+              <a:rPr lang="en-US" sz="2000" dirty="0" smtClean="0">
                 <a:solidFill>
                   <a:schemeClr val="tx1"/>
                 </a:solidFill>
               </a:rPr>
-              <a:t>(2) click on the name of the nodes and the operation symbols to create the calculation</a:t>
-            </a:r>
-            <a:endParaRPr lang="en-US" sz="2400" dirty="0">
+              <a:t>(2) </a:t>
+            </a:r>
+            <a:r>
+              <a:rPr lang="en-US" sz="2000" dirty="0">
+                <a:solidFill>
+                  <a:schemeClr val="tx1"/>
+                </a:solidFill>
+              </a:rPr>
+              <a:t>Enter the calculation by clicking on the names of nodes and typing arithmetic operators such as +, -, *, / and ^</a:t>
+            </a:r>
+            <a:r>
+              <a:rPr lang="en-US" sz="2000" dirty="0" smtClean="0">
+                <a:solidFill>
+                  <a:schemeClr val="tx1"/>
+                </a:solidFill>
+              </a:rPr>
+              <a:t>.</a:t>
+            </a:r>
+            <a:endParaRPr lang="en-US" sz="2000" dirty="0">
               <a:solidFill>
                 <a:schemeClr val="tx1"/>
               </a:solidFill>

</xml_diff>